<commit_message>
Updated references to Exercises. Added placeholders for missing notebooks.
</commit_message>
<xml_diff>
--- a/slides/01 Variables_Operators_Logic_Numerics.pptx
+++ b/slides/01 Variables_Operators_Logic_Numerics.pptx
@@ -32,7 +32,6 @@
     <p:sldId id="283" r:id="rId26"/>
     <p:sldId id="282" r:id="rId27"/>
     <p:sldId id="284" r:id="rId28"/>
-    <p:sldId id="285" r:id="rId29"/>
   </p:sldIdLst>
   <p:sldSz cx="12192000" cy="6858000"/>
   <p:notesSz cx="6858000" cy="9144000"/>
@@ -474,7 +473,7 @@
           <a:p>
             <a:fld id="{9819AC5B-5C28-4682-8A2A-3D2C4E3BE131}" type="datetimeFigureOut">
               <a:rPr lang="en-US" smtClean="0"/>
-              <a:t>7/3/2018</a:t>
+              <a:t>8/14/2018</a:t>
             </a:fld>
             <a:endParaRPr lang="en-US"/>
           </a:p>
@@ -682,7 +681,7 @@
           <a:p>
             <a:fld id="{9819AC5B-5C28-4682-8A2A-3D2C4E3BE131}" type="datetimeFigureOut">
               <a:rPr lang="en-US" smtClean="0"/>
-              <a:t>7/3/2018</a:t>
+              <a:t>8/14/2018</a:t>
             </a:fld>
             <a:endParaRPr lang="en-US"/>
           </a:p>
@@ -1136,7 +1135,7 @@
           <a:p>
             <a:fld id="{9819AC5B-5C28-4682-8A2A-3D2C4E3BE131}" type="datetimeFigureOut">
               <a:rPr lang="en-US" smtClean="0"/>
-              <a:t>7/3/2018</a:t>
+              <a:t>8/14/2018</a:t>
             </a:fld>
             <a:endParaRPr lang="en-US"/>
           </a:p>
@@ -1401,7 +1400,7 @@
           <a:p>
             <a:fld id="{9819AC5B-5C28-4682-8A2A-3D2C4E3BE131}" type="datetimeFigureOut">
               <a:rPr lang="en-US" smtClean="0"/>
-              <a:t>7/3/2018</a:t>
+              <a:t>8/14/2018</a:t>
             </a:fld>
             <a:endParaRPr lang="en-US"/>
           </a:p>
@@ -1813,7 +1812,7 @@
           <a:p>
             <a:fld id="{9819AC5B-5C28-4682-8A2A-3D2C4E3BE131}" type="datetimeFigureOut">
               <a:rPr lang="en-US" smtClean="0"/>
-              <a:t>7/3/2018</a:t>
+              <a:t>8/14/2018</a:t>
             </a:fld>
             <a:endParaRPr lang="en-US"/>
           </a:p>
@@ -1954,7 +1953,7 @@
           <a:p>
             <a:fld id="{9819AC5B-5C28-4682-8A2A-3D2C4E3BE131}" type="datetimeFigureOut">
               <a:rPr lang="en-US" smtClean="0"/>
-              <a:t>7/3/2018</a:t>
+              <a:t>8/14/2018</a:t>
             </a:fld>
             <a:endParaRPr lang="en-US"/>
           </a:p>
@@ -2067,7 +2066,7 @@
           <a:p>
             <a:fld id="{9819AC5B-5C28-4682-8A2A-3D2C4E3BE131}" type="datetimeFigureOut">
               <a:rPr lang="en-US" smtClean="0"/>
-              <a:t>7/3/2018</a:t>
+              <a:t>8/14/2018</a:t>
             </a:fld>
             <a:endParaRPr lang="en-US"/>
           </a:p>
@@ -2378,7 +2377,7 @@
           <a:p>
             <a:fld id="{9819AC5B-5C28-4682-8A2A-3D2C4E3BE131}" type="datetimeFigureOut">
               <a:rPr lang="en-US" smtClean="0"/>
-              <a:t>7/3/2018</a:t>
+              <a:t>8/14/2018</a:t>
             </a:fld>
             <a:endParaRPr lang="en-US"/>
           </a:p>
@@ -2666,7 +2665,7 @@
           <a:p>
             <a:fld id="{9819AC5B-5C28-4682-8A2A-3D2C4E3BE131}" type="datetimeFigureOut">
               <a:rPr lang="en-US" smtClean="0"/>
-              <a:t>7/3/2018</a:t>
+              <a:t>8/14/2018</a:t>
             </a:fld>
             <a:endParaRPr lang="en-US"/>
           </a:p>
@@ -2907,7 +2906,7 @@
           <a:p>
             <a:fld id="{9819AC5B-5C28-4682-8A2A-3D2C4E3BE131}" type="datetimeFigureOut">
               <a:rPr lang="en-US" smtClean="0"/>
-              <a:t>7/3/2018</a:t>
+              <a:t>8/14/2018</a:t>
             </a:fld>
             <a:endParaRPr lang="en-US"/>
           </a:p>
@@ -5387,7 +5386,7 @@
               <a:rPr lang="en-US" altLang="en-US" sz="2300" b="1" dirty="0">
                 <a:ea typeface="ＭＳ Ｐゴシック" panose="020B0600070205080204" pitchFamily="34" charset="-128"/>
               </a:rPr>
-              <a:t>Exercise 1.1</a:t>
+              <a:t>Exercise 1</a:t>
             </a:r>
           </a:p>
           <a:p>
@@ -5810,7 +5809,7 @@
               <a:rPr lang="en-US" altLang="en-US" sz="9200" b="1" dirty="0">
                 <a:ea typeface="ＭＳ Ｐゴシック" panose="020B0600070205080204" pitchFamily="34" charset="-128"/>
               </a:rPr>
-              <a:t>Exercise 1.2</a:t>
+              <a:t>Exercise 2</a:t>
             </a:r>
             <a:r>
               <a:rPr lang="en-US" altLang="en-US" sz="9200" dirty="0">
@@ -5937,7 +5936,7 @@
               <a:rPr lang="en-US" altLang="en-US" sz="9200" b="1" dirty="0">
                 <a:ea typeface="ＭＳ Ｐゴシック" panose="020B0600070205080204" pitchFamily="34" charset="-128"/>
               </a:rPr>
-              <a:t>Exercise 1.3: </a:t>
+              <a:t>Exercise 3: </a:t>
             </a:r>
             <a:r>
               <a:rPr lang="en-US" altLang="en-US" sz="9200" dirty="0">
@@ -8513,7 +8512,7 @@
               <a:rPr lang="en-US" altLang="en-US" sz="2500" b="1" dirty="0">
                 <a:ea typeface="ＭＳ Ｐゴシック" panose="020B0600070205080204" pitchFamily="34" charset="-128"/>
               </a:rPr>
-              <a:t>Exercise 1.4</a:t>
+              <a:t>Exercise 4</a:t>
             </a:r>
           </a:p>
           <a:p>
@@ -8569,177 +8568,6 @@
     <p:extLst>
       <p:ext uri="{BB962C8B-B14F-4D97-AF65-F5344CB8AC3E}">
         <p14:creationId xmlns:p14="http://schemas.microsoft.com/office/powerpoint/2010/main" val="3886019395"/>
-      </p:ext>
-    </p:extLst>
-  </p:cSld>
-  <p:clrMapOvr>
-    <a:masterClrMapping/>
-  </p:clrMapOvr>
-</p:sld>
-</file>
-
-<file path=ppt/slides/slide28.xml><?xml version="1.0" encoding="utf-8"?>
-<p:sld xmlns:a="http://schemas.openxmlformats.org/drawingml/2006/main" xmlns:r="http://schemas.openxmlformats.org/officeDocument/2006/relationships" xmlns:p="http://schemas.openxmlformats.org/presentationml/2006/main">
-  <p:cSld>
-    <p:spTree>
-      <p:nvGrpSpPr>
-        <p:cNvPr id="1" name=""/>
-        <p:cNvGrpSpPr/>
-        <p:nvPr/>
-      </p:nvGrpSpPr>
-      <p:grpSpPr>
-        <a:xfrm>
-          <a:off x="0" y="0"/>
-          <a:ext cx="0" cy="0"/>
-          <a:chOff x="0" y="0"/>
-          <a:chExt cx="0" cy="0"/>
-        </a:xfrm>
-      </p:grpSpPr>
-      <p:sp>
-        <p:nvSpPr>
-          <p:cNvPr id="2" name="Title 1">
-            <a:extLst>
-              <a:ext uri="{FF2B5EF4-FFF2-40B4-BE49-F238E27FC236}">
-                <a16:creationId xmlns:a16="http://schemas.microsoft.com/office/drawing/2014/main" id="{A3CF88B2-7D10-4512-B991-123D8BB60E9C}"/>
-              </a:ext>
-            </a:extLst>
-          </p:cNvPr>
-          <p:cNvSpPr>
-            <a:spLocks noGrp="1"/>
-          </p:cNvSpPr>
-          <p:nvPr>
-            <p:ph type="title"/>
-          </p:nvPr>
-        </p:nvSpPr>
-        <p:spPr>
-          <a:xfrm>
-            <a:off x="838200" y="365125"/>
-            <a:ext cx="10515600" cy="1325563"/>
-          </a:xfrm>
-        </p:spPr>
-        <p:txBody>
-          <a:bodyPr/>
-          <a:lstStyle/>
-          <a:p>
-            <a:r>
-              <a:rPr lang="en-US" dirty="0"/>
-              <a:t>A Recap</a:t>
-            </a:r>
-            <a:endParaRPr lang="en-US" dirty="0">
-              <a:latin typeface="Courier New" panose="02070309020205020404" pitchFamily="49" charset="0"/>
-              <a:cs typeface="Courier New" panose="02070309020205020404" pitchFamily="49" charset="0"/>
-            </a:endParaRPr>
-          </a:p>
-        </p:txBody>
-      </p:sp>
-      <p:sp>
-        <p:nvSpPr>
-          <p:cNvPr id="3" name="Content Placeholder 2">
-            <a:extLst>
-              <a:ext uri="{FF2B5EF4-FFF2-40B4-BE49-F238E27FC236}">
-                <a16:creationId xmlns:a16="http://schemas.microsoft.com/office/drawing/2014/main" id="{5F4835C5-2666-4F19-88FF-ACF2518A749F}"/>
-              </a:ext>
-            </a:extLst>
-          </p:cNvPr>
-          <p:cNvSpPr>
-            <a:spLocks noGrp="1"/>
-          </p:cNvSpPr>
-          <p:nvPr>
-            <p:ph idx="1"/>
-          </p:nvPr>
-        </p:nvSpPr>
-        <p:spPr>
-          <a:xfrm>
-            <a:off x="838200" y="2043739"/>
-            <a:ext cx="10515600" cy="2326925"/>
-          </a:xfrm>
-        </p:spPr>
-        <p:txBody>
-          <a:bodyPr>
-            <a:normAutofit/>
-          </a:bodyPr>
-          <a:lstStyle/>
-          <a:p>
-            <a:pPr marL="0" indent="0">
-              <a:lnSpc>
-                <a:spcPct val="110000"/>
-              </a:lnSpc>
-              <a:buNone/>
-            </a:pPr>
-            <a:r>
-              <a:rPr lang="en-US" altLang="en-US" sz="2500" dirty="0">
-                <a:ea typeface="ＭＳ Ｐゴシック" panose="020B0600070205080204" pitchFamily="34" charset="-128"/>
-              </a:rPr>
-              <a:t>We’ve used the math module quite a bit so far.</a:t>
-            </a:r>
-          </a:p>
-          <a:p>
-            <a:pPr marL="0" indent="0">
-              <a:lnSpc>
-                <a:spcPct val="110000"/>
-              </a:lnSpc>
-              <a:buNone/>
-            </a:pPr>
-            <a:r>
-              <a:rPr lang="en-US" altLang="en-US" sz="2500" dirty="0">
-                <a:ea typeface="ＭＳ Ｐゴシック" panose="020B0600070205080204" pitchFamily="34" charset="-128"/>
-              </a:rPr>
-              <a:t>How do we package what we just wrote so others can use it?</a:t>
-            </a:r>
-          </a:p>
-          <a:p>
-            <a:pPr marL="0" indent="0">
-              <a:lnSpc>
-                <a:spcPct val="110000"/>
-              </a:lnSpc>
-              <a:buNone/>
-            </a:pPr>
-            <a:endParaRPr lang="en-US" altLang="en-US" sz="2500" dirty="0">
-              <a:ea typeface="ＭＳ Ｐゴシック" panose="020B0600070205080204" pitchFamily="34" charset="-128"/>
-            </a:endParaRPr>
-          </a:p>
-          <a:p>
-            <a:pPr marL="0" indent="0">
-              <a:lnSpc>
-                <a:spcPct val="110000"/>
-              </a:lnSpc>
-              <a:buNone/>
-            </a:pPr>
-            <a:r>
-              <a:rPr lang="en-US" altLang="en-US" sz="2500" dirty="0">
-                <a:ea typeface="ＭＳ Ｐゴシック" panose="020B0600070205080204" pitchFamily="34" charset="-128"/>
-              </a:rPr>
-              <a:t>A brief aside on functions/modules - we’ll get into a lot more depth later!</a:t>
-            </a:r>
-          </a:p>
-          <a:p>
-            <a:pPr marL="0" indent="0">
-              <a:buFont typeface="Symbol" panose="05050102010706020507" pitchFamily="18" charset="2"/>
-              <a:buNone/>
-            </a:pPr>
-            <a:endParaRPr lang="en-US" altLang="en-US" sz="2400" dirty="0">
-              <a:latin typeface="Courier New" panose="02070309020205020404" pitchFamily="49" charset="0"/>
-              <a:ea typeface="ＭＳ Ｐゴシック" panose="020B0600070205080204" pitchFamily="34" charset="-128"/>
-              <a:cs typeface="Courier New" panose="02070309020205020404" pitchFamily="49" charset="0"/>
-            </a:endParaRPr>
-          </a:p>
-          <a:p>
-            <a:pPr marL="0" indent="0">
-              <a:buFont typeface="Symbol" panose="05050102010706020507" pitchFamily="18" charset="2"/>
-              <a:buNone/>
-            </a:pPr>
-            <a:endParaRPr lang="en-US" altLang="en-US" sz="2400" dirty="0">
-              <a:latin typeface="Courier New" panose="02070309020205020404" pitchFamily="49" charset="0"/>
-              <a:ea typeface="ＭＳ Ｐゴシック" panose="020B0600070205080204" pitchFamily="34" charset="-128"/>
-              <a:cs typeface="Courier New" panose="02070309020205020404" pitchFamily="49" charset="0"/>
-            </a:endParaRPr>
-          </a:p>
-        </p:txBody>
-      </p:sp>
-    </p:spTree>
-    <p:extLst>
-      <p:ext uri="{BB962C8B-B14F-4D97-AF65-F5344CB8AC3E}">
-        <p14:creationId xmlns:p14="http://schemas.microsoft.com/office/powerpoint/2010/main" val="2310706685"/>
       </p:ext>
     </p:extLst>
   </p:cSld>

</xml_diff>